<commit_message>
Updated link to materials
</commit_message>
<xml_diff>
--- a/Plotting in Python with Matplotlib Slides.pptx
+++ b/Plotting in Python with Matplotlib Slides.pptx
@@ -138,7 +138,7 @@
 <file path=ppt/revisionInfo.xml><?xml version="1.0" encoding="utf-8"?>
 <p1510:revInfo xmlns:a="http://schemas.openxmlformats.org/drawingml/2006/main" xmlns:r="http://schemas.openxmlformats.org/officeDocument/2006/relationships" xmlns:p1510="http://schemas.microsoft.com/office/powerpoint/2015/10/main">
   <p1510:revLst>
-    <p1510:client id="{739BE2D0-369D-4BD5-8BA6-94C4381AF508}" v="2" dt="2025-02-17T10:26:14.587"/>
+    <p1510:client id="{739BE2D0-369D-4BD5-8BA6-94C4381AF508}" v="3" dt="2025-02-17T10:47:47.117"/>
   </p1510:revLst>
 </p1510:revInfo>
 </file>
@@ -687,6 +687,90 @@
           <a:bodyPr/>
           <a:lstStyle/>
           <a:p>
+            <a:endParaRPr lang="en-GB"/>
+          </a:p>
+        </p:txBody>
+      </p:sp>
+      <p:sp>
+        <p:nvSpPr>
+          <p:cNvPr id="4" name="Slide Number Placeholder 3"/>
+          <p:cNvSpPr>
+            <a:spLocks noGrp="1"/>
+          </p:cNvSpPr>
+          <p:nvPr>
+            <p:ph type="sldNum" sz="quarter" idx="5"/>
+          </p:nvPr>
+        </p:nvSpPr>
+        <p:spPr/>
+        <p:txBody>
+          <a:bodyPr/>
+          <a:lstStyle/>
+          <a:p>
+            <a:fld id="{877663E2-27CE-4C79-91D3-7F5C4262D57F}" type="slidenum">
+              <a:rPr lang="en-US" smtClean="0"/>
+              <a:t>4</a:t>
+            </a:fld>
+            <a:endParaRPr lang="en-US"/>
+          </a:p>
+        </p:txBody>
+      </p:sp>
+    </p:spTree>
+    <p:extLst>
+      <p:ext uri="{BB962C8B-B14F-4D97-AF65-F5344CB8AC3E}">
+        <p14:creationId xmlns:p14="http://schemas.microsoft.com/office/powerpoint/2010/main" val="3034337368"/>
+      </p:ext>
+    </p:extLst>
+  </p:cSld>
+  <p:clrMapOvr>
+    <a:masterClrMapping/>
+  </p:clrMapOvr>
+</p:notes>
+</file>
+
+<file path=ppt/notesSlides/notesSlide3.xml><?xml version="1.0" encoding="utf-8"?>
+<p:notes xmlns:a="http://schemas.openxmlformats.org/drawingml/2006/main" xmlns:r="http://schemas.openxmlformats.org/officeDocument/2006/relationships" xmlns:p="http://schemas.openxmlformats.org/presentationml/2006/main">
+  <p:cSld>
+    <p:spTree>
+      <p:nvGrpSpPr>
+        <p:cNvPr id="1" name=""/>
+        <p:cNvGrpSpPr/>
+        <p:nvPr/>
+      </p:nvGrpSpPr>
+      <p:grpSpPr>
+        <a:xfrm>
+          <a:off x="0" y="0"/>
+          <a:ext cx="0" cy="0"/>
+          <a:chOff x="0" y="0"/>
+          <a:chExt cx="0" cy="0"/>
+        </a:xfrm>
+      </p:grpSpPr>
+      <p:sp>
+        <p:nvSpPr>
+          <p:cNvPr id="2" name="Slide Image Placeholder 1"/>
+          <p:cNvSpPr>
+            <a:spLocks noGrp="1" noRot="1" noChangeAspect="1"/>
+          </p:cNvSpPr>
+          <p:nvPr>
+            <p:ph type="sldImg"/>
+          </p:nvPr>
+        </p:nvSpPr>
+        <p:spPr/>
+      </p:sp>
+      <p:sp>
+        <p:nvSpPr>
+          <p:cNvPr id="3" name="Notes Placeholder 2"/>
+          <p:cNvSpPr>
+            <a:spLocks noGrp="1"/>
+          </p:cNvSpPr>
+          <p:nvPr>
+            <p:ph type="body" idx="1"/>
+          </p:nvPr>
+        </p:nvSpPr>
+        <p:spPr/>
+        <p:txBody>
+          <a:bodyPr/>
+          <a:lstStyle/>
+          <a:p>
             <a:pPr marL="0" marR="0" lvl="0" indent="0" algn="l" defTabSz="914400" rtl="0" eaLnBrk="0" fontAlgn="base" latinLnBrk="0" hangingPunct="0">
               <a:lnSpc>
                 <a:spcPct val="100000"/>
@@ -747,7 +831,7 @@
 </p:notes>
 </file>
 
-<file path=ppt/notesSlides/notesSlide3.xml><?xml version="1.0" encoding="utf-8"?>
+<file path=ppt/notesSlides/notesSlide4.xml><?xml version="1.0" encoding="utf-8"?>
 <p:notes xmlns:a="http://schemas.openxmlformats.org/drawingml/2006/main" xmlns:r="http://schemas.openxmlformats.org/officeDocument/2006/relationships" xmlns:p="http://schemas.openxmlformats.org/presentationml/2006/main">
   <p:cSld>
     <p:spTree>
@@ -19744,7 +19828,7 @@
                 <a:latin typeface="Arial" panose="020B0604020202020204" pitchFamily="34" charset="0"/>
                 <a:ea typeface="Calibri" panose="020F0502020204030204" pitchFamily="34" charset="0"/>
                 <a:cs typeface="Arial" panose="020B0604020202020204" pitchFamily="34" charset="0"/>
-                <a:hlinkClick r:id="rId2"/>
+                <a:hlinkClick r:id="rId3"/>
               </a:rPr>
               <a:t>GitHub repository</a:t>
             </a:r>
@@ -19778,7 +19862,7 @@
                 <a:latin typeface="Arial" panose="020B0604020202020204" pitchFamily="34" charset="0"/>
                 <a:ea typeface="Calibri" panose="020F0502020204030204" pitchFamily="34" charset="0"/>
                 <a:cs typeface="Arial" panose="020B0604020202020204" pitchFamily="34" charset="0"/>
-                <a:hlinkClick r:id="rId3"/>
+                <a:hlinkClick r:id="rId4"/>
               </a:rPr>
               <a:t>readme</a:t>
             </a:r>

</xml_diff>